<commit_message>
all mechatronics courses initial commit
</commit_message>
<xml_diff>
--- a/12 Drive Controls/Resourses/G120 PM240-2 CU250S-2PN.pptx
+++ b/12 Drive Controls/Resourses/G120 PM240-2 CU250S-2PN.pptx
@@ -104,6 +104,22 @@
       </a:defRPr>
     </a:lvl9pPr>
   </p:defaultTextStyle>
+  <p:extLst>
+    <p:ext uri="{EFAFB233-063F-42B5-8137-9DF3F51BA10A}">
+      <p15:sldGuideLst xmlns:p15="http://schemas.microsoft.com/office/powerpoint/2012/main">
+        <p15:guide id="1" orient="horz" pos="2160">
+          <p15:clr>
+            <a:srgbClr val="A4A3A4"/>
+          </p15:clr>
+        </p15:guide>
+        <p15:guide id="2" pos="2880">
+          <p15:clr>
+            <a:srgbClr val="A4A3A4"/>
+          </p15:clr>
+        </p15:guide>
+      </p15:sldGuideLst>
+    </p:ext>
+  </p:extLst>
 </p:presentation>
 </file>
 
@@ -289,7 +305,7 @@
             <a:fld id="{5B106E36-FD25-4E2D-B0AA-010F637433A0}" type="datetimeFigureOut">
               <a:rPr lang="ru-RU" smtClean="0"/>
               <a:pPr/>
-              <a:t>10.06.2016</a:t>
+              <a:t>26.01.2017</a:t>
             </a:fld>
             <a:endParaRPr lang="ru-RU"/>
           </a:p>
@@ -456,7 +472,7 @@
             <a:fld id="{5B106E36-FD25-4E2D-B0AA-010F637433A0}" type="datetimeFigureOut">
               <a:rPr lang="ru-RU" smtClean="0"/>
               <a:pPr/>
-              <a:t>10.06.2016</a:t>
+              <a:t>26.01.2017</a:t>
             </a:fld>
             <a:endParaRPr lang="ru-RU"/>
           </a:p>
@@ -633,7 +649,7 @@
             <a:fld id="{5B106E36-FD25-4E2D-B0AA-010F637433A0}" type="datetimeFigureOut">
               <a:rPr lang="ru-RU" smtClean="0"/>
               <a:pPr/>
-              <a:t>10.06.2016</a:t>
+              <a:t>26.01.2017</a:t>
             </a:fld>
             <a:endParaRPr lang="ru-RU"/>
           </a:p>
@@ -800,7 +816,7 @@
             <a:fld id="{5B106E36-FD25-4E2D-B0AA-010F637433A0}" type="datetimeFigureOut">
               <a:rPr lang="ru-RU" smtClean="0"/>
               <a:pPr/>
-              <a:t>10.06.2016</a:t>
+              <a:t>26.01.2017</a:t>
             </a:fld>
             <a:endParaRPr lang="ru-RU"/>
           </a:p>
@@ -1043,7 +1059,7 @@
             <a:fld id="{5B106E36-FD25-4E2D-B0AA-010F637433A0}" type="datetimeFigureOut">
               <a:rPr lang="ru-RU" smtClean="0"/>
               <a:pPr/>
-              <a:t>10.06.2016</a:t>
+              <a:t>26.01.2017</a:t>
             </a:fld>
             <a:endParaRPr lang="ru-RU"/>
           </a:p>
@@ -1328,7 +1344,7 @@
             <a:fld id="{5B106E36-FD25-4E2D-B0AA-010F637433A0}" type="datetimeFigureOut">
               <a:rPr lang="ru-RU" smtClean="0"/>
               <a:pPr/>
-              <a:t>10.06.2016</a:t>
+              <a:t>26.01.2017</a:t>
             </a:fld>
             <a:endParaRPr lang="ru-RU"/>
           </a:p>
@@ -1747,7 +1763,7 @@
             <a:fld id="{5B106E36-FD25-4E2D-B0AA-010F637433A0}" type="datetimeFigureOut">
               <a:rPr lang="ru-RU" smtClean="0"/>
               <a:pPr/>
-              <a:t>10.06.2016</a:t>
+              <a:t>26.01.2017</a:t>
             </a:fld>
             <a:endParaRPr lang="ru-RU"/>
           </a:p>
@@ -1862,7 +1878,7 @@
             <a:fld id="{5B106E36-FD25-4E2D-B0AA-010F637433A0}" type="datetimeFigureOut">
               <a:rPr lang="ru-RU" smtClean="0"/>
               <a:pPr/>
-              <a:t>10.06.2016</a:t>
+              <a:t>26.01.2017</a:t>
             </a:fld>
             <a:endParaRPr lang="ru-RU"/>
           </a:p>
@@ -1954,7 +1970,7 @@
             <a:fld id="{5B106E36-FD25-4E2D-B0AA-010F637433A0}" type="datetimeFigureOut">
               <a:rPr lang="ru-RU" smtClean="0"/>
               <a:pPr/>
-              <a:t>10.06.2016</a:t>
+              <a:t>26.01.2017</a:t>
             </a:fld>
             <a:endParaRPr lang="ru-RU"/>
           </a:p>
@@ -2228,7 +2244,7 @@
             <a:fld id="{5B106E36-FD25-4E2D-B0AA-010F637433A0}" type="datetimeFigureOut">
               <a:rPr lang="ru-RU" smtClean="0"/>
               <a:pPr/>
-              <a:t>10.06.2016</a:t>
+              <a:t>26.01.2017</a:t>
             </a:fld>
             <a:endParaRPr lang="ru-RU"/>
           </a:p>
@@ -2478,7 +2494,7 @@
             <a:fld id="{5B106E36-FD25-4E2D-B0AA-010F637433A0}" type="datetimeFigureOut">
               <a:rPr lang="ru-RU" smtClean="0"/>
               <a:pPr/>
-              <a:t>10.06.2016</a:t>
+              <a:t>26.01.2017</a:t>
             </a:fld>
             <a:endParaRPr lang="ru-RU"/>
           </a:p>
@@ -2688,7 +2704,7 @@
             <a:fld id="{5B106E36-FD25-4E2D-B0AA-010F637433A0}" type="datetimeFigureOut">
               <a:rPr lang="ru-RU" smtClean="0"/>
               <a:pPr/>
-              <a:t>10.06.2016</a:t>
+              <a:t>26.01.2017</a:t>
             </a:fld>
             <a:endParaRPr lang="ru-RU"/>
           </a:p>
@@ -5541,7 +5557,7 @@
         </p:nvSpPr>
         <p:spPr>
           <a:xfrm>
-            <a:off x="7246719" y="1142977"/>
+            <a:off x="7332532" y="1142977"/>
             <a:ext cx="1537912" cy="934478"/>
           </a:xfrm>
           <a:prstGeom prst="rect">

</xml_diff>